<commit_message>
add week 5 slide
</commit_message>
<xml_diff>
--- a/class5/Class_5_Presentation.pptx
+++ b/class5/Class_5_Presentation.pptx
@@ -5,7 +5,7 @@
     <p:sldMasterId id="2147483686" r:id="rId1"/>
   </p:sldMasterIdLst>
   <p:notesMasterIdLst>
-    <p:notesMasterId r:id="rId16"/>
+    <p:notesMasterId r:id="rId22"/>
   </p:notesMasterIdLst>
   <p:sldIdLst>
     <p:sldId id="256" r:id="rId2"/>
@@ -22,6 +22,12 @@
     <p:sldId id="270" r:id="rId13"/>
     <p:sldId id="269" r:id="rId14"/>
     <p:sldId id="271" r:id="rId15"/>
+    <p:sldId id="272" r:id="rId16"/>
+    <p:sldId id="273" r:id="rId17"/>
+    <p:sldId id="274" r:id="rId18"/>
+    <p:sldId id="275" r:id="rId19"/>
+    <p:sldId id="276" r:id="rId20"/>
+    <p:sldId id="277" r:id="rId21"/>
   </p:sldIdLst>
   <p:sldSz cx="12192000" cy="6858000"/>
   <p:notesSz cx="6858000" cy="9144000"/>
@@ -120,6 +126,11 @@
       </a:defRPr>
     </a:lvl9pPr>
   </p:defaultTextStyle>
+  <p:extLst>
+    <p:ext uri="{EFAFB233-063F-42B5-8137-9DF3F51BA10A}">
+      <p15:sldGuideLst xmlns:p15="http://schemas.microsoft.com/office/powerpoint/2012/main"/>
+    </p:ext>
+  </p:extLst>
 </p:presentation>
 </file>
 
@@ -9533,7 +9544,7 @@
           <a:p>
             <a:fld id="{0D18DB15-D16F-C747-A579-C31EF58A6C49}" type="datetimeFigureOut">
               <a:rPr lang="en-US" smtClean="0"/>
-              <a:t>5/11/25</a:t>
+              <a:t>5/27/25</a:t>
             </a:fld>
             <a:endParaRPr lang="en-US"/>
           </a:p>
@@ -10419,7 +10430,7 @@
           <a:p>
             <a:fld id="{E80C50CD-E178-4744-9B35-B2F624D6C5E9}" type="datetimeFigureOut">
               <a:rPr lang="en-US" smtClean="0"/>
-              <a:t>5/11/25</a:t>
+              <a:t>5/27/25</a:t>
             </a:fld>
             <a:endParaRPr lang="en-US"/>
           </a:p>
@@ -10617,7 +10628,7 @@
           <a:p>
             <a:fld id="{E80C50CD-E178-4744-9B35-B2F624D6C5E9}" type="datetimeFigureOut">
               <a:rPr lang="en-US" smtClean="0"/>
-              <a:t>5/11/25</a:t>
+              <a:t>5/27/25</a:t>
             </a:fld>
             <a:endParaRPr lang="en-US"/>
           </a:p>
@@ -10825,7 +10836,7 @@
           <a:p>
             <a:fld id="{E80C50CD-E178-4744-9B35-B2F624D6C5E9}" type="datetimeFigureOut">
               <a:rPr lang="en-US" smtClean="0"/>
-              <a:t>5/11/25</a:t>
+              <a:t>5/27/25</a:t>
             </a:fld>
             <a:endParaRPr lang="en-US"/>
           </a:p>
@@ -11075,7 +11086,7 @@
           <a:p>
             <a:fld id="{E80C50CD-E178-4744-9B35-B2F624D6C5E9}" type="datetimeFigureOut">
               <a:rPr lang="en-US" smtClean="0"/>
-              <a:t>5/11/25</a:t>
+              <a:t>5/27/25</a:t>
             </a:fld>
             <a:endParaRPr lang="en-US"/>
           </a:p>
@@ -11354,7 +11365,7 @@
           <a:p>
             <a:fld id="{E80C50CD-E178-4744-9B35-B2F624D6C5E9}" type="datetimeFigureOut">
               <a:rPr lang="en-US" smtClean="0"/>
-              <a:t>5/11/25</a:t>
+              <a:t>5/27/25</a:t>
             </a:fld>
             <a:endParaRPr lang="en-US"/>
           </a:p>
@@ -11671,7 +11682,7 @@
           <a:p>
             <a:fld id="{E80C50CD-E178-4744-9B35-B2F624D6C5E9}" type="datetimeFigureOut">
               <a:rPr lang="en-US" smtClean="0"/>
-              <a:t>5/11/25</a:t>
+              <a:t>5/27/25</a:t>
             </a:fld>
             <a:endParaRPr lang="en-US"/>
           </a:p>
@@ -12087,7 +12098,7 @@
           <a:p>
             <a:fld id="{E80C50CD-E178-4744-9B35-B2F624D6C5E9}" type="datetimeFigureOut">
               <a:rPr lang="en-US" smtClean="0"/>
-              <a:t>5/11/25</a:t>
+              <a:t>5/27/25</a:t>
             </a:fld>
             <a:endParaRPr lang="en-US"/>
           </a:p>
@@ -12228,7 +12239,7 @@
           <a:p>
             <a:fld id="{E80C50CD-E178-4744-9B35-B2F624D6C5E9}" type="datetimeFigureOut">
               <a:rPr lang="en-US" smtClean="0"/>
-              <a:t>5/11/25</a:t>
+              <a:t>5/27/25</a:t>
             </a:fld>
             <a:endParaRPr lang="en-US"/>
           </a:p>
@@ -12341,7 +12352,7 @@
           <a:p>
             <a:fld id="{E80C50CD-E178-4744-9B35-B2F624D6C5E9}" type="datetimeFigureOut">
               <a:rPr lang="en-US" smtClean="0"/>
-              <a:t>5/11/25</a:t>
+              <a:t>5/27/25</a:t>
             </a:fld>
             <a:endParaRPr lang="en-US"/>
           </a:p>
@@ -12658,7 +12669,7 @@
           <a:p>
             <a:fld id="{E80C50CD-E178-4744-9B35-B2F624D6C5E9}" type="datetimeFigureOut">
               <a:rPr lang="en-US" smtClean="0"/>
-              <a:t>5/11/25</a:t>
+              <a:t>5/27/25</a:t>
             </a:fld>
             <a:endParaRPr lang="en-US"/>
           </a:p>
@@ -12950,7 +12961,7 @@
           <a:p>
             <a:fld id="{E80C50CD-E178-4744-9B35-B2F624D6C5E9}" type="datetimeFigureOut">
               <a:rPr lang="en-US" smtClean="0"/>
-              <a:t>5/11/25</a:t>
+              <a:t>5/27/25</a:t>
             </a:fld>
             <a:endParaRPr lang="en-US"/>
           </a:p>
@@ -13190,7 +13201,7 @@
             <a:fld id="{E80C50CD-E178-4744-9B35-B2F624D6C5E9}" type="datetimeFigureOut">
               <a:rPr lang="en-US" smtClean="0"/>
               <a:pPr/>
-              <a:t>5/11/25</a:t>
+              <a:t>5/27/25</a:t>
             </a:fld>
             <a:endParaRPr lang="en-US"/>
           </a:p>
@@ -14806,19 +14817,34 @@
             <p:ph type="title"/>
           </p:nvPr>
         </p:nvSpPr>
-        <p:spPr/>
+        <p:spPr>
+          <a:xfrm>
+            <a:off x="521208" y="978408"/>
+            <a:ext cx="11155680" cy="1035449"/>
+          </a:xfrm>
+        </p:spPr>
         <p:txBody>
-          <a:bodyPr/>
+          <a:bodyPr>
+            <a:noAutofit/>
+          </a:bodyPr>
           <a:lstStyle/>
           <a:p>
             <a:r>
-              <a:rPr lang="en-US" b="1" dirty="0"/>
-              <a:t>GPU Infrastructure</a:t>
+              <a:rPr lang="en-US" sz="3600" b="1" dirty="0"/>
+              <a:t>Project 5 - Hands-On Tasks</a:t>
+            </a:r>
+            <a:r>
+              <a:rPr lang="en-US" sz="3600" dirty="0"/>
+              <a:t> </a:t>
+            </a:r>
+            <a:r>
+              <a:rPr lang="en-US" sz="3600" b="1" dirty="0"/>
+              <a:t>Challenging Project</a:t>
             </a:r>
             <a:br>
-              <a:rPr lang="en-US" dirty="0"/>
+              <a:rPr lang="en-US" sz="3600" dirty="0"/>
             </a:br>
-            <a:endParaRPr lang="en-US" dirty="0"/>
+            <a:endParaRPr lang="en-US" sz="3600" dirty="0"/>
           </a:p>
         </p:txBody>
       </p:sp>
@@ -14838,10 +14864,80 @@
             <p:ph idx="1"/>
           </p:nvPr>
         </p:nvSpPr>
-        <p:spPr/>
+        <p:spPr>
+          <a:xfrm>
+            <a:off x="518160" y="2252036"/>
+            <a:ext cx="11155680" cy="3767328"/>
+          </a:xfrm>
+        </p:spPr>
         <p:txBody>
           <a:bodyPr/>
           <a:lstStyle/>
+          <a:p>
+            <a:pPr>
+              <a:buFont typeface="Arial" panose="020B0604020202020204" pitchFamily="34" charset="0"/>
+              <a:buChar char="•"/>
+            </a:pPr>
+            <a:r>
+              <a:rPr lang="en-US" b="1" dirty="0"/>
+              <a:t>Task 1</a:t>
+            </a:r>
+            <a:r>
+              <a:rPr lang="en-US" dirty="0"/>
+              <a:t>: Select Hugging Face dataset, convert to </a:t>
+            </a:r>
+            <a:r>
+              <a:rPr lang="en-US" dirty="0" err="1"/>
+              <a:t>ChatML</a:t>
+            </a:r>
+            <a:endParaRPr lang="en-US" dirty="0"/>
+          </a:p>
+          <a:p>
+            <a:pPr>
+              <a:buFont typeface="Arial" panose="020B0604020202020204" pitchFamily="34" charset="0"/>
+              <a:buChar char="•"/>
+            </a:pPr>
+            <a:r>
+              <a:rPr lang="en-US" b="1" dirty="0"/>
+              <a:t>Task 2</a:t>
+            </a:r>
+            <a:r>
+              <a:rPr lang="en-US" dirty="0"/>
+              <a:t>: </a:t>
+            </a:r>
+            <a:r>
+              <a:rPr lang="en-US" dirty="0" err="1"/>
+              <a:t>LoRA</a:t>
+            </a:r>
+            <a:r>
+              <a:rPr lang="en-US" dirty="0"/>
+              <a:t> finetuning (~30 min run)</a:t>
+            </a:r>
+          </a:p>
+          <a:p>
+            <a:pPr>
+              <a:buFont typeface="Arial" panose="020B0604020202020204" pitchFamily="34" charset="0"/>
+              <a:buChar char="•"/>
+            </a:pPr>
+            <a:r>
+              <a:rPr lang="en-US" b="1" dirty="0"/>
+              <a:t>Task 3</a:t>
+            </a:r>
+            <a:r>
+              <a:rPr lang="en-US" dirty="0"/>
+              <a:t>: Full finetuning (~2hr run), compare results</a:t>
+            </a:r>
+          </a:p>
+          <a:p>
+            <a:pPr>
+              <a:buFont typeface="Arial" panose="020B0604020202020204" pitchFamily="34" charset="0"/>
+              <a:buChar char="•"/>
+            </a:pPr>
+            <a:r>
+              <a:rPr lang="en-US" dirty="0"/>
+              <a:t>Metrics: loss, accuracy, eval on new prompts</a:t>
+            </a:r>
+          </a:p>
           <a:p>
             <a:endParaRPr lang="en-US" dirty="0"/>
           </a:p>
@@ -14851,6 +14947,964 @@
     <p:extLst>
       <p:ext uri="{BB962C8B-B14F-4D97-AF65-F5344CB8AC3E}">
         <p14:creationId xmlns:p14="http://schemas.microsoft.com/office/powerpoint/2010/main" val="4091115249"/>
+      </p:ext>
+    </p:extLst>
+  </p:cSld>
+  <p:clrMapOvr>
+    <a:masterClrMapping/>
+  </p:clrMapOvr>
+</p:sld>
+</file>
+
+<file path=ppt/slides/slide15.xml><?xml version="1.0" encoding="utf-8"?>
+<p:sld xmlns:a="http://schemas.openxmlformats.org/drawingml/2006/main" xmlns:r="http://schemas.openxmlformats.org/officeDocument/2006/relationships" xmlns:p="http://schemas.openxmlformats.org/presentationml/2006/main">
+  <p:cSld>
+    <p:spTree>
+      <p:nvGrpSpPr>
+        <p:cNvPr id="1" name=""/>
+        <p:cNvGrpSpPr/>
+        <p:nvPr/>
+      </p:nvGrpSpPr>
+      <p:grpSpPr>
+        <a:xfrm>
+          <a:off x="0" y="0"/>
+          <a:ext cx="0" cy="0"/>
+          <a:chOff x="0" y="0"/>
+          <a:chExt cx="0" cy="0"/>
+        </a:xfrm>
+      </p:grpSpPr>
+      <p:sp>
+        <p:nvSpPr>
+          <p:cNvPr id="2" name="Title 1">
+            <a:extLst>
+              <a:ext uri="{FF2B5EF4-FFF2-40B4-BE49-F238E27FC236}">
+                <a16:creationId xmlns:a16="http://schemas.microsoft.com/office/drawing/2014/main" id="{5503D6AE-55B4-11FE-1546-DEC9FF2B773B}"/>
+              </a:ext>
+            </a:extLst>
+          </p:cNvPr>
+          <p:cNvSpPr>
+            <a:spLocks noGrp="1"/>
+          </p:cNvSpPr>
+          <p:nvPr>
+            <p:ph type="title"/>
+          </p:nvPr>
+        </p:nvSpPr>
+        <p:spPr/>
+        <p:txBody>
+          <a:bodyPr/>
+          <a:lstStyle/>
+          <a:p>
+            <a:r>
+              <a:rPr lang="en-US" b="1" dirty="0"/>
+              <a:t>Evaluation Criteria</a:t>
+            </a:r>
+            <a:br>
+              <a:rPr lang="en-US" dirty="0"/>
+            </a:br>
+            <a:endParaRPr lang="en-US" dirty="0"/>
+          </a:p>
+        </p:txBody>
+      </p:sp>
+      <p:sp>
+        <p:nvSpPr>
+          <p:cNvPr id="3" name="Content Placeholder 2">
+            <a:extLst>
+              <a:ext uri="{FF2B5EF4-FFF2-40B4-BE49-F238E27FC236}">
+                <a16:creationId xmlns:a16="http://schemas.microsoft.com/office/drawing/2014/main" id="{247D30BD-1F13-F5CA-2462-F45D54A92113}"/>
+              </a:ext>
+            </a:extLst>
+          </p:cNvPr>
+          <p:cNvSpPr>
+            <a:spLocks noGrp="1"/>
+          </p:cNvSpPr>
+          <p:nvPr>
+            <p:ph idx="1"/>
+          </p:nvPr>
+        </p:nvSpPr>
+        <p:spPr/>
+        <p:txBody>
+          <a:bodyPr/>
+          <a:lstStyle/>
+          <a:p>
+            <a:pPr>
+              <a:buFont typeface="Arial" panose="020B0604020202020204" pitchFamily="34" charset="0"/>
+              <a:buChar char="•"/>
+            </a:pPr>
+            <a:r>
+              <a:rPr lang="en-US" dirty="0"/>
+              <a:t>Correct formatting &amp; preprocessing</a:t>
+            </a:r>
+          </a:p>
+          <a:p>
+            <a:pPr>
+              <a:buFont typeface="Arial" panose="020B0604020202020204" pitchFamily="34" charset="0"/>
+              <a:buChar char="•"/>
+            </a:pPr>
+            <a:r>
+              <a:rPr lang="en-US" dirty="0"/>
+              <a:t>GPU setup &amp; logs (</a:t>
+            </a:r>
+            <a:r>
+              <a:rPr lang="en-US" dirty="0" err="1"/>
+              <a:t>InferenceAI</a:t>
+            </a:r>
+            <a:r>
+              <a:rPr lang="en-US" dirty="0"/>
+              <a:t>)</a:t>
+            </a:r>
+          </a:p>
+          <a:p>
+            <a:pPr>
+              <a:buFont typeface="Arial" panose="020B0604020202020204" pitchFamily="34" charset="0"/>
+              <a:buChar char="•"/>
+            </a:pPr>
+            <a:r>
+              <a:rPr lang="en-US" dirty="0"/>
+              <a:t>Hyperparameter tuning: LR, epochs, batch size</a:t>
+            </a:r>
+          </a:p>
+          <a:p>
+            <a:pPr>
+              <a:buFont typeface="Arial" panose="020B0604020202020204" pitchFamily="34" charset="0"/>
+              <a:buChar char="•"/>
+            </a:pPr>
+            <a:r>
+              <a:rPr lang="en-US" dirty="0"/>
+              <a:t>Clear report: </a:t>
+            </a:r>
+            <a:r>
+              <a:rPr lang="en-US" dirty="0" err="1"/>
+              <a:t>LoRA</a:t>
+            </a:r>
+            <a:r>
+              <a:rPr lang="en-US" dirty="0"/>
+              <a:t> vs Full</a:t>
+            </a:r>
+          </a:p>
+          <a:p>
+            <a:pPr>
+              <a:buFont typeface="Arial" panose="020B0604020202020204" pitchFamily="34" charset="0"/>
+              <a:buChar char="•"/>
+            </a:pPr>
+            <a:r>
+              <a:rPr lang="en-US" dirty="0"/>
+              <a:t>Bonus: try </a:t>
+            </a:r>
+            <a:r>
+              <a:rPr lang="en-US" dirty="0" err="1"/>
+              <a:t>QLoRA</a:t>
+            </a:r>
+            <a:r>
+              <a:rPr lang="en-US" dirty="0"/>
+              <a:t> or 2-bit </a:t>
+            </a:r>
+            <a:r>
+              <a:rPr lang="en-US" dirty="0" err="1"/>
+              <a:t>LowRA</a:t>
+            </a:r>
+            <a:endParaRPr lang="en-US" dirty="0"/>
+          </a:p>
+        </p:txBody>
+      </p:sp>
+    </p:spTree>
+    <p:extLst>
+      <p:ext uri="{BB962C8B-B14F-4D97-AF65-F5344CB8AC3E}">
+        <p14:creationId xmlns:p14="http://schemas.microsoft.com/office/powerpoint/2010/main" val="688793148"/>
+      </p:ext>
+    </p:extLst>
+  </p:cSld>
+  <p:clrMapOvr>
+    <a:masterClrMapping/>
+  </p:clrMapOvr>
+</p:sld>
+</file>
+
+<file path=ppt/slides/slide16.xml><?xml version="1.0" encoding="utf-8"?>
+<p:sld xmlns:a="http://schemas.openxmlformats.org/drawingml/2006/main" xmlns:r="http://schemas.openxmlformats.org/officeDocument/2006/relationships" xmlns:p="http://schemas.openxmlformats.org/presentationml/2006/main">
+  <p:cSld>
+    <p:spTree>
+      <p:nvGrpSpPr>
+        <p:cNvPr id="1" name=""/>
+        <p:cNvGrpSpPr/>
+        <p:nvPr/>
+      </p:nvGrpSpPr>
+      <p:grpSpPr>
+        <a:xfrm>
+          <a:off x="0" y="0"/>
+          <a:ext cx="0" cy="0"/>
+          <a:chOff x="0" y="0"/>
+          <a:chExt cx="0" cy="0"/>
+        </a:xfrm>
+      </p:grpSpPr>
+      <p:sp>
+        <p:nvSpPr>
+          <p:cNvPr id="2" name="Title 1">
+            <a:extLst>
+              <a:ext uri="{FF2B5EF4-FFF2-40B4-BE49-F238E27FC236}">
+                <a16:creationId xmlns:a16="http://schemas.microsoft.com/office/drawing/2014/main" id="{8F903019-F568-DFCE-7F1E-661D1BFA17E6}"/>
+              </a:ext>
+            </a:extLst>
+          </p:cNvPr>
+          <p:cNvSpPr>
+            <a:spLocks noGrp="1"/>
+          </p:cNvSpPr>
+          <p:nvPr>
+            <p:ph type="title"/>
+          </p:nvPr>
+        </p:nvSpPr>
+        <p:spPr/>
+        <p:txBody>
+          <a:bodyPr/>
+          <a:lstStyle/>
+          <a:p>
+            <a:r>
+              <a:rPr lang="en-US" b="1" dirty="0"/>
+              <a:t>RAG vs. Fine-Tuning - Comparison</a:t>
+            </a:r>
+            <a:br>
+              <a:rPr lang="en-US" dirty="0"/>
+            </a:br>
+            <a:endParaRPr lang="en-US" dirty="0"/>
+          </a:p>
+        </p:txBody>
+      </p:sp>
+      <p:graphicFrame>
+        <p:nvGraphicFramePr>
+          <p:cNvPr id="4" name="Content Placeholder 3">
+            <a:extLst>
+              <a:ext uri="{FF2B5EF4-FFF2-40B4-BE49-F238E27FC236}">
+                <a16:creationId xmlns:a16="http://schemas.microsoft.com/office/drawing/2014/main" id="{8C945C09-B0E5-35DF-65C4-396B13DB6C71}"/>
+              </a:ext>
+            </a:extLst>
+          </p:cNvPr>
+          <p:cNvGraphicFramePr>
+            <a:graphicFrameLocks noGrp="1"/>
+          </p:cNvGraphicFramePr>
+          <p:nvPr>
+            <p:ph idx="1"/>
+            <p:extLst>
+              <p:ext uri="{D42A27DB-BD31-4B8C-83A1-F6EECF244321}">
+                <p14:modId xmlns:p14="http://schemas.microsoft.com/office/powerpoint/2010/main" val="3789640671"/>
+              </p:ext>
+            </p:extLst>
+          </p:nvPr>
+        </p:nvGraphicFramePr>
+        <p:xfrm>
+          <a:off x="520700" y="2578100"/>
+          <a:ext cx="11156949" cy="2225040"/>
+        </p:xfrm>
+        <a:graphic>
+          <a:graphicData uri="http://schemas.openxmlformats.org/drawingml/2006/table">
+            <a:tbl>
+              <a:tblPr firstRow="1" bandRow="1">
+                <a:tableStyleId>{5C22544A-7EE6-4342-B048-85BDC9FD1C3A}</a:tableStyleId>
+              </a:tblPr>
+              <a:tblGrid>
+                <a:gridCol w="1772557">
+                  <a:extLst>
+                    <a:ext uri="{9D8B030D-6E8A-4147-A177-3AD203B41FA5}">
+                      <a16:colId xmlns:a16="http://schemas.microsoft.com/office/drawing/2014/main" val="4198710466"/>
+                    </a:ext>
+                  </a:extLst>
+                </a:gridCol>
+                <a:gridCol w="4717143">
+                  <a:extLst>
+                    <a:ext uri="{9D8B030D-6E8A-4147-A177-3AD203B41FA5}">
+                      <a16:colId xmlns:a16="http://schemas.microsoft.com/office/drawing/2014/main" val="691919829"/>
+                    </a:ext>
+                  </a:extLst>
+                </a:gridCol>
+                <a:gridCol w="4667249">
+                  <a:extLst>
+                    <a:ext uri="{9D8B030D-6E8A-4147-A177-3AD203B41FA5}">
+                      <a16:colId xmlns:a16="http://schemas.microsoft.com/office/drawing/2014/main" val="1209435514"/>
+                    </a:ext>
+                  </a:extLst>
+                </a:gridCol>
+              </a:tblGrid>
+              <a:tr h="370840">
+                <a:tc>
+                  <a:txBody>
+                    <a:bodyPr/>
+                    <a:lstStyle/>
+                    <a:p>
+                      <a:r>
+                        <a:rPr lang="en-US" dirty="0"/>
+                        <a:t>Aspect</a:t>
+                      </a:r>
+                    </a:p>
+                  </a:txBody>
+                  <a:tcPr anchor="ctr"/>
+                </a:tc>
+                <a:tc>
+                  <a:txBody>
+                    <a:bodyPr/>
+                    <a:lstStyle/>
+                    <a:p>
+                      <a:r>
+                        <a:rPr lang="en-US"/>
+                        <a:t>Retrieval-Augmented Generation (RAG)</a:t>
+                      </a:r>
+                    </a:p>
+                  </a:txBody>
+                  <a:tcPr anchor="ctr"/>
+                </a:tc>
+                <a:tc>
+                  <a:txBody>
+                    <a:bodyPr/>
+                    <a:lstStyle/>
+                    <a:p>
+                      <a:r>
+                        <a:rPr lang="en-US"/>
+                        <a:t>Supervised Fine-Tuning (SFT)</a:t>
+                      </a:r>
+                    </a:p>
+                  </a:txBody>
+                  <a:tcPr anchor="ctr"/>
+                </a:tc>
+                <a:extLst>
+                  <a:ext uri="{0D108BD9-81ED-4DB2-BD59-A6C34878D82A}">
+                    <a16:rowId xmlns:a16="http://schemas.microsoft.com/office/drawing/2014/main" val="2029004540"/>
+                  </a:ext>
+                </a:extLst>
+              </a:tr>
+              <a:tr h="370840">
+                <a:tc>
+                  <a:txBody>
+                    <a:bodyPr/>
+                    <a:lstStyle/>
+                    <a:p>
+                      <a:r>
+                        <a:rPr lang="en-US"/>
+                        <a:t>How it Works</a:t>
+                      </a:r>
+                    </a:p>
+                  </a:txBody>
+                  <a:tcPr anchor="ctr"/>
+                </a:tc>
+                <a:tc>
+                  <a:txBody>
+                    <a:bodyPr/>
+                    <a:lstStyle/>
+                    <a:p>
+                      <a:r>
+                        <a:rPr lang="en-US"/>
+                        <a:t>Retrieves up-to-date info to augment prompts</a:t>
+                      </a:r>
+                    </a:p>
+                  </a:txBody>
+                  <a:tcPr anchor="ctr"/>
+                </a:tc>
+                <a:tc>
+                  <a:txBody>
+                    <a:bodyPr/>
+                    <a:lstStyle/>
+                    <a:p>
+                      <a:r>
+                        <a:rPr lang="en-US"/>
+                        <a:t>Specializes model using labeled data</a:t>
+                      </a:r>
+                    </a:p>
+                  </a:txBody>
+                  <a:tcPr anchor="ctr"/>
+                </a:tc>
+                <a:extLst>
+                  <a:ext uri="{0D108BD9-81ED-4DB2-BD59-A6C34878D82A}">
+                    <a16:rowId xmlns:a16="http://schemas.microsoft.com/office/drawing/2014/main" val="710227170"/>
+                  </a:ext>
+                </a:extLst>
+              </a:tr>
+              <a:tr h="370840">
+                <a:tc>
+                  <a:txBody>
+                    <a:bodyPr/>
+                    <a:lstStyle/>
+                    <a:p>
+                      <a:r>
+                        <a:rPr lang="en-US"/>
+                        <a:t>Strengths</a:t>
+                      </a:r>
+                    </a:p>
+                  </a:txBody>
+                  <a:tcPr anchor="ctr"/>
+                </a:tc>
+                <a:tc>
+                  <a:txBody>
+                    <a:bodyPr/>
+                    <a:lstStyle/>
+                    <a:p>
+                      <a:r>
+                        <a:rPr lang="en-US"/>
+                        <a:t>Transparent, dynamic, sources info</a:t>
+                      </a:r>
+                    </a:p>
+                  </a:txBody>
+                  <a:tcPr anchor="ctr"/>
+                </a:tc>
+                <a:tc>
+                  <a:txBody>
+                    <a:bodyPr/>
+                    <a:lstStyle/>
+                    <a:p>
+                      <a:r>
+                        <a:rPr lang="en-US"/>
+                        <a:t>Influences model behavior, faster inference</a:t>
+                      </a:r>
+                    </a:p>
+                  </a:txBody>
+                  <a:tcPr anchor="ctr"/>
+                </a:tc>
+                <a:extLst>
+                  <a:ext uri="{0D108BD9-81ED-4DB2-BD59-A6C34878D82A}">
+                    <a16:rowId xmlns:a16="http://schemas.microsoft.com/office/drawing/2014/main" val="1305244667"/>
+                  </a:ext>
+                </a:extLst>
+              </a:tr>
+              <a:tr h="370840">
+                <a:tc>
+                  <a:txBody>
+                    <a:bodyPr/>
+                    <a:lstStyle/>
+                    <a:p>
+                      <a:r>
+                        <a:rPr lang="en-US"/>
+                        <a:t>Weaknesses</a:t>
+                      </a:r>
+                    </a:p>
+                  </a:txBody>
+                  <a:tcPr anchor="ctr"/>
+                </a:tc>
+                <a:tc>
+                  <a:txBody>
+                    <a:bodyPr/>
+                    <a:lstStyle/>
+                    <a:p>
+                      <a:r>
+                        <a:rPr lang="en-US"/>
+                        <a:t>Does not change model weights</a:t>
+                      </a:r>
+                    </a:p>
+                  </a:txBody>
+                  <a:tcPr anchor="ctr"/>
+                </a:tc>
+                <a:tc>
+                  <a:txBody>
+                    <a:bodyPr/>
+                    <a:lstStyle/>
+                    <a:p>
+                      <a:r>
+                        <a:rPr lang="en-US"/>
+                        <a:t>Cutoff after training, static knowledge</a:t>
+                      </a:r>
+                    </a:p>
+                  </a:txBody>
+                  <a:tcPr anchor="ctr"/>
+                </a:tc>
+                <a:extLst>
+                  <a:ext uri="{0D108BD9-81ED-4DB2-BD59-A6C34878D82A}">
+                    <a16:rowId xmlns:a16="http://schemas.microsoft.com/office/drawing/2014/main" val="136391597"/>
+                  </a:ext>
+                </a:extLst>
+              </a:tr>
+              <a:tr h="370840">
+                <a:tc>
+                  <a:txBody>
+                    <a:bodyPr/>
+                    <a:lstStyle/>
+                    <a:p>
+                      <a:r>
+                        <a:rPr lang="en-US"/>
+                        <a:t>Best For</a:t>
+                      </a:r>
+                    </a:p>
+                  </a:txBody>
+                  <a:tcPr anchor="ctr"/>
+                </a:tc>
+                <a:tc>
+                  <a:txBody>
+                    <a:bodyPr/>
+                    <a:lstStyle/>
+                    <a:p>
+                      <a:r>
+                        <a:rPr lang="en-US"/>
+                        <a:t>Changing data, explainability</a:t>
+                      </a:r>
+                    </a:p>
+                  </a:txBody>
+                  <a:tcPr anchor="ctr"/>
+                </a:tc>
+                <a:tc>
+                  <a:txBody>
+                    <a:bodyPr/>
+                    <a:lstStyle/>
+                    <a:p>
+                      <a:r>
+                        <a:rPr lang="en-US"/>
+                        <a:t>Domain expertise, task alignment</a:t>
+                      </a:r>
+                    </a:p>
+                  </a:txBody>
+                  <a:tcPr anchor="ctr"/>
+                </a:tc>
+                <a:extLst>
+                  <a:ext uri="{0D108BD9-81ED-4DB2-BD59-A6C34878D82A}">
+                    <a16:rowId xmlns:a16="http://schemas.microsoft.com/office/drawing/2014/main" val="1796167183"/>
+                  </a:ext>
+                </a:extLst>
+              </a:tr>
+              <a:tr h="370840">
+                <a:tc>
+                  <a:txBody>
+                    <a:bodyPr/>
+                    <a:lstStyle/>
+                    <a:p>
+                      <a:r>
+                        <a:rPr lang="en-US"/>
+                        <a:t>Combo</a:t>
+                      </a:r>
+                    </a:p>
+                  </a:txBody>
+                  <a:tcPr anchor="ctr"/>
+                </a:tc>
+                <a:tc>
+                  <a:txBody>
+                    <a:bodyPr/>
+                    <a:lstStyle/>
+                    <a:p>
+                      <a:r>
+                        <a:rPr lang="en-US" dirty="0"/>
+                        <a:t>Great when paired with fine-tuning</a:t>
+                      </a:r>
+                    </a:p>
+                  </a:txBody>
+                  <a:tcPr anchor="ctr"/>
+                </a:tc>
+                <a:tc>
+                  <a:txBody>
+                    <a:bodyPr/>
+                    <a:lstStyle/>
+                    <a:p>
+                      <a:r>
+                        <a:rPr lang="en-US" dirty="0"/>
+                        <a:t>Enables dynamic + specialized reasoning</a:t>
+                      </a:r>
+                    </a:p>
+                  </a:txBody>
+                  <a:tcPr anchor="ctr"/>
+                </a:tc>
+                <a:extLst>
+                  <a:ext uri="{0D108BD9-81ED-4DB2-BD59-A6C34878D82A}">
+                    <a16:rowId xmlns:a16="http://schemas.microsoft.com/office/drawing/2014/main" val="3568094155"/>
+                  </a:ext>
+                </a:extLst>
+              </a:tr>
+            </a:tbl>
+          </a:graphicData>
+        </a:graphic>
+      </p:graphicFrame>
+    </p:spTree>
+    <p:extLst>
+      <p:ext uri="{BB962C8B-B14F-4D97-AF65-F5344CB8AC3E}">
+        <p14:creationId xmlns:p14="http://schemas.microsoft.com/office/powerpoint/2010/main" val="812198686"/>
+      </p:ext>
+    </p:extLst>
+  </p:cSld>
+  <p:clrMapOvr>
+    <a:masterClrMapping/>
+  </p:clrMapOvr>
+</p:sld>
+</file>
+
+<file path=ppt/slides/slide17.xml><?xml version="1.0" encoding="utf-8"?>
+<p:sld xmlns:a="http://schemas.openxmlformats.org/drawingml/2006/main" xmlns:r="http://schemas.openxmlformats.org/officeDocument/2006/relationships" xmlns:p="http://schemas.openxmlformats.org/presentationml/2006/main">
+  <p:cSld>
+    <p:spTree>
+      <p:nvGrpSpPr>
+        <p:cNvPr id="1" name=""/>
+        <p:cNvGrpSpPr/>
+        <p:nvPr/>
+      </p:nvGrpSpPr>
+      <p:grpSpPr>
+        <a:xfrm>
+          <a:off x="0" y="0"/>
+          <a:ext cx="0" cy="0"/>
+          <a:chOff x="0" y="0"/>
+          <a:chExt cx="0" cy="0"/>
+        </a:xfrm>
+      </p:grpSpPr>
+      <p:sp>
+        <p:nvSpPr>
+          <p:cNvPr id="2" name="Title 1">
+            <a:extLst>
+              <a:ext uri="{FF2B5EF4-FFF2-40B4-BE49-F238E27FC236}">
+                <a16:creationId xmlns:a16="http://schemas.microsoft.com/office/drawing/2014/main" id="{A551C1E6-E5C6-1022-0BA3-11E74809B082}"/>
+              </a:ext>
+            </a:extLst>
+          </p:cNvPr>
+          <p:cNvSpPr>
+            <a:spLocks noGrp="1"/>
+          </p:cNvSpPr>
+          <p:nvPr>
+            <p:ph type="title"/>
+          </p:nvPr>
+        </p:nvSpPr>
+        <p:spPr/>
+        <p:txBody>
+          <a:bodyPr/>
+          <a:lstStyle/>
+          <a:p>
+            <a:r>
+              <a:rPr lang="en-US" b="1" dirty="0"/>
+              <a:t>Wrap-Up</a:t>
+            </a:r>
+            <a:br>
+              <a:rPr lang="en-US" dirty="0"/>
+            </a:br>
+            <a:endParaRPr lang="en-US" dirty="0"/>
+          </a:p>
+        </p:txBody>
+      </p:sp>
+      <p:sp>
+        <p:nvSpPr>
+          <p:cNvPr id="3" name="Content Placeholder 2">
+            <a:extLst>
+              <a:ext uri="{FF2B5EF4-FFF2-40B4-BE49-F238E27FC236}">
+                <a16:creationId xmlns:a16="http://schemas.microsoft.com/office/drawing/2014/main" id="{678C0237-3C60-EE19-72C4-E42D74642D90}"/>
+              </a:ext>
+            </a:extLst>
+          </p:cNvPr>
+          <p:cNvSpPr>
+            <a:spLocks noGrp="1"/>
+          </p:cNvSpPr>
+          <p:nvPr>
+            <p:ph idx="1"/>
+          </p:nvPr>
+        </p:nvSpPr>
+        <p:spPr/>
+        <p:txBody>
+          <a:bodyPr/>
+          <a:lstStyle/>
+          <a:p>
+            <a:pPr>
+              <a:buFont typeface="Arial" panose="020B0604020202020204" pitchFamily="34" charset="0"/>
+              <a:buChar char="•"/>
+            </a:pPr>
+            <a:r>
+              <a:rPr lang="en-US" dirty="0"/>
+              <a:t>SFT is foundational for task-specific model deployment</a:t>
+            </a:r>
+          </a:p>
+          <a:p>
+            <a:pPr>
+              <a:buFont typeface="Arial" panose="020B0604020202020204" pitchFamily="34" charset="0"/>
+              <a:buChar char="•"/>
+            </a:pPr>
+            <a:r>
+              <a:rPr lang="en-US" dirty="0" err="1"/>
+              <a:t>LoRA</a:t>
+            </a:r>
+            <a:r>
+              <a:rPr lang="en-US" dirty="0"/>
+              <a:t> makes fine-tuning accessible</a:t>
+            </a:r>
+          </a:p>
+          <a:p>
+            <a:pPr>
+              <a:buFont typeface="Arial" panose="020B0604020202020204" pitchFamily="34" charset="0"/>
+              <a:buChar char="•"/>
+            </a:pPr>
+            <a:r>
+              <a:rPr lang="en-US" dirty="0"/>
+              <a:t>Use modern toolchains (TRL, </a:t>
+            </a:r>
+            <a:r>
+              <a:rPr lang="en-US" dirty="0" err="1"/>
+              <a:t>DeepSpeed</a:t>
+            </a:r>
+            <a:r>
+              <a:rPr lang="en-US" dirty="0"/>
+              <a:t>)</a:t>
+            </a:r>
+          </a:p>
+          <a:p>
+            <a:pPr>
+              <a:buFont typeface="Arial" panose="020B0604020202020204" pitchFamily="34" charset="0"/>
+              <a:buChar char="•"/>
+            </a:pPr>
+            <a:r>
+              <a:rPr lang="en-US" dirty="0"/>
+              <a:t>Start prepping your data today!</a:t>
+            </a:r>
+          </a:p>
+        </p:txBody>
+      </p:sp>
+    </p:spTree>
+    <p:extLst>
+      <p:ext uri="{BB962C8B-B14F-4D97-AF65-F5344CB8AC3E}">
+        <p14:creationId xmlns:p14="http://schemas.microsoft.com/office/powerpoint/2010/main" val="3883759448"/>
+      </p:ext>
+    </p:extLst>
+  </p:cSld>
+  <p:clrMapOvr>
+    <a:masterClrMapping/>
+  </p:clrMapOvr>
+</p:sld>
+</file>
+
+<file path=ppt/slides/slide18.xml><?xml version="1.0" encoding="utf-8"?>
+<p:sld xmlns:a="http://schemas.openxmlformats.org/drawingml/2006/main" xmlns:r="http://schemas.openxmlformats.org/officeDocument/2006/relationships" xmlns:p="http://schemas.openxmlformats.org/presentationml/2006/main">
+  <p:cSld>
+    <p:spTree>
+      <p:nvGrpSpPr>
+        <p:cNvPr id="1" name=""/>
+        <p:cNvGrpSpPr/>
+        <p:nvPr/>
+      </p:nvGrpSpPr>
+      <p:grpSpPr>
+        <a:xfrm>
+          <a:off x="0" y="0"/>
+          <a:ext cx="0" cy="0"/>
+          <a:chOff x="0" y="0"/>
+          <a:chExt cx="0" cy="0"/>
+        </a:xfrm>
+      </p:grpSpPr>
+      <p:sp>
+        <p:nvSpPr>
+          <p:cNvPr id="2" name="Title 1">
+            <a:extLst>
+              <a:ext uri="{FF2B5EF4-FFF2-40B4-BE49-F238E27FC236}">
+                <a16:creationId xmlns:a16="http://schemas.microsoft.com/office/drawing/2014/main" id="{1EF70E4E-B1BF-453A-6129-49A1E90A497F}"/>
+              </a:ext>
+            </a:extLst>
+          </p:cNvPr>
+          <p:cNvSpPr>
+            <a:spLocks noGrp="1"/>
+          </p:cNvSpPr>
+          <p:nvPr>
+            <p:ph type="title"/>
+          </p:nvPr>
+        </p:nvSpPr>
+        <p:spPr/>
+        <p:txBody>
+          <a:bodyPr/>
+          <a:lstStyle/>
+          <a:p>
+            <a:r>
+              <a:rPr lang="en-US" b="1" dirty="0"/>
+              <a:t>Resources</a:t>
+            </a:r>
+            <a:br>
+              <a:rPr lang="en-US" dirty="0"/>
+            </a:br>
+            <a:endParaRPr lang="en-US" dirty="0"/>
+          </a:p>
+        </p:txBody>
+      </p:sp>
+      <p:sp>
+        <p:nvSpPr>
+          <p:cNvPr id="3" name="Content Placeholder 2">
+            <a:extLst>
+              <a:ext uri="{FF2B5EF4-FFF2-40B4-BE49-F238E27FC236}">
+                <a16:creationId xmlns:a16="http://schemas.microsoft.com/office/drawing/2014/main" id="{91C7311A-5274-1ECD-1024-338A688CEEBA}"/>
+              </a:ext>
+            </a:extLst>
+          </p:cNvPr>
+          <p:cNvSpPr>
+            <a:spLocks noGrp="1"/>
+          </p:cNvSpPr>
+          <p:nvPr>
+            <p:ph idx="1"/>
+          </p:nvPr>
+        </p:nvSpPr>
+        <p:spPr/>
+        <p:txBody>
+          <a:bodyPr/>
+          <a:lstStyle/>
+          <a:p>
+            <a:pPr>
+              <a:buFont typeface="Arial" panose="020B0604020202020204" pitchFamily="34" charset="0"/>
+              <a:buChar char="•"/>
+            </a:pPr>
+            <a:r>
+              <a:rPr lang="en-US" dirty="0">
+                <a:hlinkClick r:id="rId2"/>
+              </a:rPr>
+              <a:t>Hugging Face LoRA Guide</a:t>
+            </a:r>
+            <a:endParaRPr lang="en-US" dirty="0"/>
+          </a:p>
+          <a:p>
+            <a:pPr>
+              <a:buFont typeface="Arial" panose="020B0604020202020204" pitchFamily="34" charset="0"/>
+              <a:buChar char="•"/>
+            </a:pPr>
+            <a:r>
+              <a:rPr lang="en-US" dirty="0">
+                <a:hlinkClick r:id="rId3"/>
+              </a:rPr>
+              <a:t>DeepSpeed Docs</a:t>
+            </a:r>
+            <a:endParaRPr lang="en-US" dirty="0"/>
+          </a:p>
+          <a:p>
+            <a:pPr>
+              <a:buFont typeface="Arial" panose="020B0604020202020204" pitchFamily="34" charset="0"/>
+              <a:buChar char="•"/>
+            </a:pPr>
+            <a:r>
+              <a:rPr lang="en-US" dirty="0">
+                <a:hlinkClick r:id="rId4"/>
+              </a:rPr>
+              <a:t>TRL Package</a:t>
+            </a:r>
+            <a:endParaRPr lang="en-US" dirty="0"/>
+          </a:p>
+          <a:p>
+            <a:pPr>
+              <a:buFont typeface="Arial" panose="020B0604020202020204" pitchFamily="34" charset="0"/>
+              <a:buChar char="•"/>
+            </a:pPr>
+            <a:r>
+              <a:rPr lang="en-US" dirty="0">
+                <a:hlinkClick r:id="rId5"/>
+              </a:rPr>
+              <a:t>LoRA Paper</a:t>
+            </a:r>
+            <a:endParaRPr lang="en-US" dirty="0"/>
+          </a:p>
+          <a:p>
+            <a:endParaRPr lang="en-US" dirty="0"/>
+          </a:p>
+        </p:txBody>
+      </p:sp>
+    </p:spTree>
+    <p:extLst>
+      <p:ext uri="{BB962C8B-B14F-4D97-AF65-F5344CB8AC3E}">
+        <p14:creationId xmlns:p14="http://schemas.microsoft.com/office/powerpoint/2010/main" val="280392658"/>
+      </p:ext>
+    </p:extLst>
+  </p:cSld>
+  <p:clrMapOvr>
+    <a:masterClrMapping/>
+  </p:clrMapOvr>
+</p:sld>
+</file>
+
+<file path=ppt/slides/slide19.xml><?xml version="1.0" encoding="utf-8"?>
+<p:sld xmlns:a="http://schemas.openxmlformats.org/drawingml/2006/main" xmlns:r="http://schemas.openxmlformats.org/officeDocument/2006/relationships" xmlns:p="http://schemas.openxmlformats.org/presentationml/2006/main">
+  <p:cSld>
+    <p:spTree>
+      <p:nvGrpSpPr>
+        <p:cNvPr id="1" name=""/>
+        <p:cNvGrpSpPr/>
+        <p:nvPr/>
+      </p:nvGrpSpPr>
+      <p:grpSpPr>
+        <a:xfrm>
+          <a:off x="0" y="0"/>
+          <a:ext cx="0" cy="0"/>
+          <a:chOff x="0" y="0"/>
+          <a:chExt cx="0" cy="0"/>
+        </a:xfrm>
+      </p:grpSpPr>
+      <p:sp>
+        <p:nvSpPr>
+          <p:cNvPr id="2" name="Title 1">
+            <a:extLst>
+              <a:ext uri="{FF2B5EF4-FFF2-40B4-BE49-F238E27FC236}">
+                <a16:creationId xmlns:a16="http://schemas.microsoft.com/office/drawing/2014/main" id="{543496F6-56E7-0609-F924-370526E92FAE}"/>
+              </a:ext>
+            </a:extLst>
+          </p:cNvPr>
+          <p:cNvSpPr>
+            <a:spLocks noGrp="1"/>
+          </p:cNvSpPr>
+          <p:nvPr>
+            <p:ph type="title"/>
+          </p:nvPr>
+        </p:nvSpPr>
+        <p:spPr/>
+        <p:txBody>
+          <a:bodyPr/>
+          <a:lstStyle/>
+          <a:p>
+            <a:r>
+              <a:rPr lang="en-US" b="1" dirty="0"/>
+              <a:t>Next Week - SFT Part II</a:t>
+            </a:r>
+            <a:br>
+              <a:rPr lang="en-US" dirty="0"/>
+            </a:br>
+            <a:endParaRPr lang="en-US" dirty="0"/>
+          </a:p>
+        </p:txBody>
+      </p:sp>
+      <p:sp>
+        <p:nvSpPr>
+          <p:cNvPr id="3" name="Content Placeholder 2">
+            <a:extLst>
+              <a:ext uri="{FF2B5EF4-FFF2-40B4-BE49-F238E27FC236}">
+                <a16:creationId xmlns:a16="http://schemas.microsoft.com/office/drawing/2014/main" id="{6747386C-D589-9957-504D-65BFC50D2DEB}"/>
+              </a:ext>
+            </a:extLst>
+          </p:cNvPr>
+          <p:cNvSpPr>
+            <a:spLocks noGrp="1"/>
+          </p:cNvSpPr>
+          <p:nvPr>
+            <p:ph idx="1"/>
+          </p:nvPr>
+        </p:nvSpPr>
+        <p:spPr/>
+        <p:txBody>
+          <a:bodyPr/>
+          <a:lstStyle/>
+          <a:p>
+            <a:pPr>
+              <a:buFont typeface="Arial" panose="020B0604020202020204" pitchFamily="34" charset="0"/>
+              <a:buChar char="•"/>
+            </a:pPr>
+            <a:r>
+              <a:rPr lang="en-US" dirty="0"/>
+              <a:t>Synthetic data generation</a:t>
+            </a:r>
+          </a:p>
+          <a:p>
+            <a:pPr>
+              <a:buFont typeface="Arial" panose="020B0604020202020204" pitchFamily="34" charset="0"/>
+              <a:buChar char="•"/>
+            </a:pPr>
+            <a:r>
+              <a:rPr lang="en-US" dirty="0"/>
+              <a:t>Model evaluation</a:t>
+            </a:r>
+          </a:p>
+          <a:p>
+            <a:pPr>
+              <a:buFont typeface="Arial" panose="020B0604020202020204" pitchFamily="34" charset="0"/>
+              <a:buChar char="•"/>
+            </a:pPr>
+            <a:r>
+              <a:rPr lang="en-US" dirty="0"/>
+              <a:t>Data diversity &amp; quality</a:t>
+            </a:r>
+          </a:p>
+          <a:p>
+            <a:pPr>
+              <a:buFont typeface="Arial" panose="020B0604020202020204" pitchFamily="34" charset="0"/>
+              <a:buChar char="•"/>
+            </a:pPr>
+            <a:r>
+              <a:rPr lang="en-US" dirty="0"/>
+              <a:t>Using LLMs as judges (Elo, Rejection Sampling)</a:t>
+            </a:r>
+          </a:p>
+        </p:txBody>
+      </p:sp>
+    </p:spTree>
+    <p:extLst>
+      <p:ext uri="{BB962C8B-B14F-4D97-AF65-F5344CB8AC3E}">
+        <p14:creationId xmlns:p14="http://schemas.microsoft.com/office/powerpoint/2010/main" val="3897152368"/>
       </p:ext>
     </p:extLst>
   </p:cSld>
@@ -15021,6 +16075,69 @@
     <p:extLst>
       <p:ext uri="{BB962C8B-B14F-4D97-AF65-F5344CB8AC3E}">
         <p14:creationId xmlns:p14="http://schemas.microsoft.com/office/powerpoint/2010/main" val="2445992470"/>
+      </p:ext>
+    </p:extLst>
+  </p:cSld>
+  <p:clrMapOvr>
+    <a:masterClrMapping/>
+  </p:clrMapOvr>
+</p:sld>
+</file>
+
+<file path=ppt/slides/slide20.xml><?xml version="1.0" encoding="utf-8"?>
+<p:sld xmlns:a="http://schemas.openxmlformats.org/drawingml/2006/main" xmlns:r="http://schemas.openxmlformats.org/officeDocument/2006/relationships" xmlns:p="http://schemas.openxmlformats.org/presentationml/2006/main">
+  <p:cSld>
+    <p:spTree>
+      <p:nvGrpSpPr>
+        <p:cNvPr id="1" name=""/>
+        <p:cNvGrpSpPr/>
+        <p:nvPr/>
+      </p:nvGrpSpPr>
+      <p:grpSpPr>
+        <a:xfrm>
+          <a:off x="0" y="0"/>
+          <a:ext cx="0" cy="0"/>
+          <a:chOff x="0" y="0"/>
+          <a:chExt cx="0" cy="0"/>
+        </a:xfrm>
+      </p:grpSpPr>
+      <p:sp>
+        <p:nvSpPr>
+          <p:cNvPr id="2" name="Title 1">
+            <a:extLst>
+              <a:ext uri="{FF2B5EF4-FFF2-40B4-BE49-F238E27FC236}">
+                <a16:creationId xmlns:a16="http://schemas.microsoft.com/office/drawing/2014/main" id="{E86D7DE4-D576-6880-379F-DE448C0DD6CE}"/>
+              </a:ext>
+            </a:extLst>
+          </p:cNvPr>
+          <p:cNvSpPr>
+            <a:spLocks noGrp="1"/>
+          </p:cNvSpPr>
+          <p:nvPr>
+            <p:ph type="title"/>
+          </p:nvPr>
+        </p:nvSpPr>
+        <p:spPr>
+          <a:xfrm>
+            <a:off x="4628751" y="3271665"/>
+            <a:ext cx="11155680" cy="1463040"/>
+          </a:xfrm>
+        </p:spPr>
+        <p:txBody>
+          <a:bodyPr/>
+          <a:lstStyle/>
+          <a:p>
+            <a:r>
+              <a:rPr lang="en-US" dirty="0"/>
+              <a:t>Thank You</a:t>
+            </a:r>
+          </a:p>
+        </p:txBody>
+      </p:sp>
+    </p:spTree>
+    <p:extLst>
+      <p:ext uri="{BB962C8B-B14F-4D97-AF65-F5344CB8AC3E}">
+        <p14:creationId xmlns:p14="http://schemas.microsoft.com/office/powerpoint/2010/main" val="3052272083"/>
       </p:ext>
     </p:extLst>
   </p:cSld>

</xml_diff>